<commit_message>
Modification on the solution part
</commit_message>
<xml_diff>
--- a/Design Patterns.pptx
+++ b/Design Patterns.pptx
@@ -14,10 +14,10 @@
     <p:sldId id="267" r:id="rId8"/>
     <p:sldId id="277" r:id="rId9"/>
     <p:sldId id="278" r:id="rId10"/>
-    <p:sldId id="281" r:id="rId11"/>
-    <p:sldId id="280" r:id="rId12"/>
+    <p:sldId id="287" r:id="rId11"/>
+    <p:sldId id="286" r:id="rId12"/>
     <p:sldId id="282" r:id="rId13"/>
-    <p:sldId id="283" r:id="rId14"/>
+    <p:sldId id="280" r:id="rId14"/>
     <p:sldId id="284" r:id="rId15"/>
     <p:sldId id="285" r:id="rId16"/>
     <p:sldId id="265" r:id="rId17"/>
@@ -149,10 +149,10 @@
           <p14:sldIdLst>
             <p14:sldId id="277"/>
             <p14:sldId id="278"/>
-            <p14:sldId id="281"/>
+            <p14:sldId id="287"/>
+            <p14:sldId id="286"/>
+            <p14:sldId id="282"/>
             <p14:sldId id="280"/>
-            <p14:sldId id="282"/>
-            <p14:sldId id="283"/>
             <p14:sldId id="284"/>
             <p14:sldId id="285"/>
           </p14:sldIdLst>
@@ -4403,10 +4403,13 @@
                   <a:srgbClr val="E6E6E6"/>
                 </a:solidFill>
               </a:rPr>
-              <a:t>Removing code that perform actions from the object to state classes</a:t>
-            </a:r>
-          </a:p>
-          <a:p>
+              <a:t>Create an interface that represent the different actions of the object</a:t>
+            </a:r>
+          </a:p>
+          <a:p>
+            <a:pPr marL="0" indent="0">
+              <a:buNone/>
+            </a:pPr>
             <a:endParaRPr lang="en-US">
               <a:solidFill>
                 <a:schemeClr val="bg1"/>
@@ -4418,7 +4421,7 @@
     </p:spTree>
     <p:extLst>
       <p:ext uri="{BB962C8B-B14F-4D97-AF65-F5344CB8AC3E}">
-        <p14:creationId xmlns:p14="http://schemas.microsoft.com/office/powerpoint/2010/main" val="1141923344"/>
+        <p14:creationId xmlns:p14="http://schemas.microsoft.com/office/powerpoint/2010/main" val="1156178996"/>
       </p:ext>
     </p:extLst>
   </p:cSld>
@@ -4505,18 +4508,32 @@
           </a:bodyPr>
           <a:lstStyle/>
           <a:p>
+            <a:r>
+              <a:rPr lang="en-US">
+                <a:solidFill>
+                  <a:srgbClr val="E6E6E6"/>
+                </a:solidFill>
+              </a:rPr>
+              <a:t>First step :</a:t>
+            </a:r>
+          </a:p>
+          <a:p>
+            <a:pPr lvl="1"/>
+            <a:r>
+              <a:rPr lang="en-US">
+                <a:solidFill>
+                  <a:srgbClr val="E6E6E6"/>
+                </a:solidFill>
+              </a:rPr>
+              <a:t>Create an interface that represent the different actions of the object</a:t>
+            </a:r>
+          </a:p>
+          <a:p>
             <a:pPr marL="0" indent="0">
               <a:buNone/>
             </a:pPr>
             <a:endParaRPr lang="en-US">
               <a:solidFill>
-                <a:srgbClr val="E6E6E6"/>
-              </a:solidFill>
-            </a:endParaRPr>
-          </a:p>
-          <a:p>
-            <a:endParaRPr lang="en-US">
-              <a:solidFill>
                 <a:schemeClr val="bg1"/>
               </a:solidFill>
             </a:endParaRPr>
@@ -4525,10 +4542,10 @@
       </p:sp>
       <p:pic>
         <p:nvPicPr>
-          <p:cNvPr id="5" name="Picture 3">
-            <a:extLst>
-              <a:ext uri="{FF2B5EF4-FFF2-40B4-BE49-F238E27FC236}">
-                <a16:creationId xmlns:a16="http://schemas.microsoft.com/office/drawing/2014/main" id="{FFC65D16-5F12-2CCB-C2B5-340B8AF54B59}"/>
+          <p:cNvPr id="5" name="Image 4">
+            <a:extLst>
+              <a:ext uri="{FF2B5EF4-FFF2-40B4-BE49-F238E27FC236}">
+                <a16:creationId xmlns:a16="http://schemas.microsoft.com/office/drawing/2014/main" id="{0D8CF43B-B27A-8023-A1EA-00C79F9119E8}"/>
               </a:ext>
             </a:extLst>
           </p:cNvPr>
@@ -4545,206 +4562,18 @@
         </p:blipFill>
         <p:spPr>
           <a:xfrm>
-            <a:off x="0" y="1497914"/>
-            <a:ext cx="5943014" cy="5360086"/>
+            <a:off x="4045343" y="3429000"/>
+            <a:ext cx="3724795" cy="2286319"/>
           </a:xfrm>
           <a:prstGeom prst="rect">
             <a:avLst/>
           </a:prstGeom>
         </p:spPr>
       </p:pic>
-      <p:pic>
-        <p:nvPicPr>
-          <p:cNvPr id="8" name="Image 7">
-            <a:extLst>
-              <a:ext uri="{FF2B5EF4-FFF2-40B4-BE49-F238E27FC236}">
-                <a16:creationId xmlns:a16="http://schemas.microsoft.com/office/drawing/2014/main" id="{46A645EE-6280-0BDE-8E6A-3C6CD3E5503B}"/>
-              </a:ext>
-            </a:extLst>
-          </p:cNvPr>
-          <p:cNvPicPr>
-            <a:picLocks noChangeAspect="1"/>
-          </p:cNvPicPr>
-          <p:nvPr/>
-        </p:nvPicPr>
-        <p:blipFill>
-          <a:blip r:embed="rId3"/>
-          <a:stretch>
-            <a:fillRect/>
-          </a:stretch>
-        </p:blipFill>
-        <p:spPr>
-          <a:xfrm>
-            <a:off x="9158872" y="5186466"/>
-            <a:ext cx="2595925" cy="1157449"/>
-          </a:xfrm>
-          <a:prstGeom prst="rect">
-            <a:avLst/>
-          </a:prstGeom>
-        </p:spPr>
-      </p:pic>
-      <p:pic>
-        <p:nvPicPr>
-          <p:cNvPr id="10" name="Image 9">
-            <a:extLst>
-              <a:ext uri="{FF2B5EF4-FFF2-40B4-BE49-F238E27FC236}">
-                <a16:creationId xmlns:a16="http://schemas.microsoft.com/office/drawing/2014/main" id="{9E3BF5B0-AA2E-D056-A59C-1B983EE544AC}"/>
-              </a:ext>
-            </a:extLst>
-          </p:cNvPr>
-          <p:cNvPicPr>
-            <a:picLocks noChangeAspect="1"/>
-          </p:cNvPicPr>
-          <p:nvPr/>
-        </p:nvPicPr>
-        <p:blipFill>
-          <a:blip r:embed="rId4"/>
-          <a:stretch>
-            <a:fillRect/>
-          </a:stretch>
-        </p:blipFill>
-        <p:spPr>
-          <a:xfrm>
-            <a:off x="7509683" y="3623796"/>
-            <a:ext cx="2491432" cy="1108321"/>
-          </a:xfrm>
-          <a:prstGeom prst="rect">
-            <a:avLst/>
-          </a:prstGeom>
-        </p:spPr>
-      </p:pic>
-      <p:pic>
-        <p:nvPicPr>
-          <p:cNvPr id="12" name="Image 11">
-            <a:extLst>
-              <a:ext uri="{FF2B5EF4-FFF2-40B4-BE49-F238E27FC236}">
-                <a16:creationId xmlns:a16="http://schemas.microsoft.com/office/drawing/2014/main" id="{93415F69-A8D4-CFDF-CCD0-AD361B560A42}"/>
-              </a:ext>
-            </a:extLst>
-          </p:cNvPr>
-          <p:cNvPicPr>
-            <a:picLocks noChangeAspect="1"/>
-          </p:cNvPicPr>
-          <p:nvPr/>
-        </p:nvPicPr>
-        <p:blipFill>
-          <a:blip r:embed="rId5"/>
-          <a:stretch>
-            <a:fillRect/>
-          </a:stretch>
-        </p:blipFill>
-        <p:spPr>
-          <a:xfrm>
-            <a:off x="6614541" y="2030176"/>
-            <a:ext cx="1790283" cy="1139271"/>
-          </a:xfrm>
-          <a:prstGeom prst="rect">
-            <a:avLst/>
-          </a:prstGeom>
-        </p:spPr>
-      </p:pic>
-      <p:sp>
-        <p:nvSpPr>
-          <p:cNvPr id="13" name="Flèche : droite rayée 12">
-            <a:extLst>
-              <a:ext uri="{FF2B5EF4-FFF2-40B4-BE49-F238E27FC236}">
-                <a16:creationId xmlns:a16="http://schemas.microsoft.com/office/drawing/2014/main" id="{8F804CE9-7DCF-6A3E-3CBD-F752932FEF5D}"/>
-              </a:ext>
-            </a:extLst>
-          </p:cNvPr>
-          <p:cNvSpPr/>
-          <p:nvPr/>
-        </p:nvSpPr>
-        <p:spPr>
-          <a:xfrm>
-            <a:off x="5458932" y="3810994"/>
-            <a:ext cx="997353" cy="733926"/>
-          </a:xfrm>
-          <a:prstGeom prst="stripedRightArrow">
-            <a:avLst/>
-          </a:prstGeom>
-        </p:spPr>
-        <p:style>
-          <a:lnRef idx="2">
-            <a:schemeClr val="accent1">
-              <a:shade val="15000"/>
-            </a:schemeClr>
-          </a:lnRef>
-          <a:fillRef idx="1">
-            <a:schemeClr val="accent1"/>
-          </a:fillRef>
-          <a:effectRef idx="0">
-            <a:schemeClr val="accent1"/>
-          </a:effectRef>
-          <a:fontRef idx="minor">
-            <a:schemeClr val="lt1"/>
-          </a:fontRef>
-        </p:style>
-        <p:txBody>
-          <a:bodyPr rtlCol="0" anchor="ctr"/>
-          <a:lstStyle/>
-          <a:p>
-            <a:pPr algn="ctr"/>
-            <a:endParaRPr lang="fr-BE"/>
-          </a:p>
-        </p:txBody>
-      </p:sp>
-      <p:sp>
-        <p:nvSpPr>
-          <p:cNvPr id="7" name="Rectangle 6">
-            <a:extLst>
-              <a:ext uri="{FF2B5EF4-FFF2-40B4-BE49-F238E27FC236}">
-                <a16:creationId xmlns:a16="http://schemas.microsoft.com/office/drawing/2014/main" id="{3D8B3FEA-2F31-D7E6-FA75-D8E73CD9C808}"/>
-              </a:ext>
-            </a:extLst>
-          </p:cNvPr>
-          <p:cNvSpPr/>
-          <p:nvPr/>
-        </p:nvSpPr>
-        <p:spPr>
-          <a:xfrm>
-            <a:off x="838200" y="4419400"/>
-            <a:ext cx="4564075" cy="2073475"/>
-          </a:xfrm>
-          <a:prstGeom prst="rect">
-            <a:avLst/>
-          </a:prstGeom>
-          <a:noFill/>
-          <a:ln w="28575">
-            <a:solidFill>
-              <a:srgbClr val="FF0000"/>
-            </a:solidFill>
-          </a:ln>
-        </p:spPr>
-        <p:style>
-          <a:lnRef idx="2">
-            <a:schemeClr val="accent1">
-              <a:shade val="15000"/>
-            </a:schemeClr>
-          </a:lnRef>
-          <a:fillRef idx="1">
-            <a:schemeClr val="accent1"/>
-          </a:fillRef>
-          <a:effectRef idx="0">
-            <a:schemeClr val="accent1"/>
-          </a:effectRef>
-          <a:fontRef idx="minor">
-            <a:schemeClr val="lt1"/>
-          </a:fontRef>
-        </p:style>
-        <p:txBody>
-          <a:bodyPr rtlCol="0" anchor="ctr"/>
-          <a:lstStyle/>
-          <a:p>
-            <a:pPr algn="ctr"/>
-            <a:endParaRPr lang="fr-BE"/>
-          </a:p>
-        </p:txBody>
-      </p:sp>
     </p:spTree>
     <p:extLst>
       <p:ext uri="{BB962C8B-B14F-4D97-AF65-F5344CB8AC3E}">
-        <p14:creationId xmlns:p14="http://schemas.microsoft.com/office/powerpoint/2010/main" val="450544265"/>
+        <p14:creationId xmlns:p14="http://schemas.microsoft.com/office/powerpoint/2010/main" val="1622045216"/>
       </p:ext>
     </p:extLst>
   </p:cSld>
@@ -4848,7 +4677,7 @@
                   <a:srgbClr val="E6E6E6"/>
                 </a:solidFill>
               </a:rPr>
-              <a:t>Removing code that perform actions from the object to state classes</a:t>
+              <a:t>Create an interface that represent the different actions of the object</a:t>
             </a:r>
           </a:p>
           <a:p>
@@ -4876,7 +4705,7 @@
                   <a:srgbClr val="E6E6E6"/>
                 </a:solidFill>
               </a:rPr>
-              <a:t>Create an interface that represent the different actions of the object</a:t>
+              <a:t>Removing code that represent behaviors from the object</a:t>
             </a:r>
           </a:p>
           <a:p>
@@ -4991,7 +4820,7 @@
           </a:bodyPr>
           <a:lstStyle/>
           <a:p>
-            <a:pPr marL="457200" lvl="1" indent="0">
+            <a:pPr marL="0" indent="0">
               <a:buNone/>
             </a:pPr>
             <a:endParaRPr lang="en-US">
@@ -5011,10 +4840,10 @@
       </p:sp>
       <p:pic>
         <p:nvPicPr>
-          <p:cNvPr id="8" name="Image 7">
-            <a:extLst>
-              <a:ext uri="{FF2B5EF4-FFF2-40B4-BE49-F238E27FC236}">
-                <a16:creationId xmlns:a16="http://schemas.microsoft.com/office/drawing/2014/main" id="{3C91DB8B-A3C9-007A-2CAD-F6F36B5165E2}"/>
+          <p:cNvPr id="5" name="Picture 3">
+            <a:extLst>
+              <a:ext uri="{FF2B5EF4-FFF2-40B4-BE49-F238E27FC236}">
+                <a16:creationId xmlns:a16="http://schemas.microsoft.com/office/drawing/2014/main" id="{FFC65D16-5F12-2CCB-C2B5-340B8AF54B59}"/>
               </a:ext>
             </a:extLst>
           </p:cNvPr>
@@ -5031,8 +4860,8 @@
         </p:blipFill>
         <p:spPr>
           <a:xfrm>
-            <a:off x="286407" y="1651876"/>
-            <a:ext cx="11619186" cy="4698935"/>
+            <a:off x="197223" y="2139076"/>
+            <a:ext cx="3707489" cy="3343835"/>
           </a:xfrm>
           <a:prstGeom prst="rect">
             <a:avLst/>
@@ -5041,10 +4870,10 @@
       </p:pic>
       <p:sp>
         <p:nvSpPr>
-          <p:cNvPr id="9" name="Rectangle 8">
-            <a:extLst>
-              <a:ext uri="{FF2B5EF4-FFF2-40B4-BE49-F238E27FC236}">
-                <a16:creationId xmlns:a16="http://schemas.microsoft.com/office/drawing/2014/main" id="{560169DC-5B91-C905-46EB-E2C10463B348}"/>
+          <p:cNvPr id="7" name="Rectangle 6">
+            <a:extLst>
+              <a:ext uri="{FF2B5EF4-FFF2-40B4-BE49-F238E27FC236}">
+                <a16:creationId xmlns:a16="http://schemas.microsoft.com/office/drawing/2014/main" id="{3D8B3FEA-2F31-D7E6-FA75-D8E73CD9C808}"/>
               </a:ext>
             </a:extLst>
           </p:cNvPr>
@@ -5053,8 +4882,90 @@
         </p:nvSpPr>
         <p:spPr>
           <a:xfrm>
-            <a:off x="286407" y="2222938"/>
-            <a:ext cx="4118906" cy="1592317"/>
+            <a:off x="792236" y="4001344"/>
+            <a:ext cx="2883293" cy="1243009"/>
+          </a:xfrm>
+          <a:prstGeom prst="rect">
+            <a:avLst/>
+          </a:prstGeom>
+          <a:noFill/>
+          <a:ln w="28575">
+            <a:solidFill>
+              <a:srgbClr val="FF0000"/>
+            </a:solidFill>
+          </a:ln>
+        </p:spPr>
+        <p:style>
+          <a:lnRef idx="2">
+            <a:schemeClr val="accent1">
+              <a:shade val="15000"/>
+            </a:schemeClr>
+          </a:lnRef>
+          <a:fillRef idx="1">
+            <a:schemeClr val="accent1"/>
+          </a:fillRef>
+          <a:effectRef idx="0">
+            <a:schemeClr val="accent1"/>
+          </a:effectRef>
+          <a:fontRef idx="minor">
+            <a:schemeClr val="lt1"/>
+          </a:fontRef>
+        </p:style>
+        <p:txBody>
+          <a:bodyPr rtlCol="0" anchor="ctr"/>
+          <a:lstStyle/>
+          <a:p>
+            <a:pPr algn="ctr"/>
+            <a:endParaRPr lang="fr-BE"/>
+          </a:p>
+        </p:txBody>
+      </p:sp>
+      <p:pic>
+        <p:nvPicPr>
+          <p:cNvPr id="6" name="Image 5">
+            <a:extLst>
+              <a:ext uri="{FF2B5EF4-FFF2-40B4-BE49-F238E27FC236}">
+                <a16:creationId xmlns:a16="http://schemas.microsoft.com/office/drawing/2014/main" id="{3CB0D3E5-8045-F634-FC7F-DF1030EA841D}"/>
+              </a:ext>
+            </a:extLst>
+          </p:cNvPr>
+          <p:cNvPicPr>
+            <a:picLocks noChangeAspect="1"/>
+          </p:cNvPicPr>
+          <p:nvPr/>
+        </p:nvPicPr>
+        <p:blipFill>
+          <a:blip r:embed="rId3"/>
+          <a:stretch>
+            <a:fillRect/>
+          </a:stretch>
+        </p:blipFill>
+        <p:spPr>
+          <a:xfrm>
+            <a:off x="4499725" y="2753350"/>
+            <a:ext cx="7644781" cy="3091639"/>
+          </a:xfrm>
+          <a:prstGeom prst="rect">
+            <a:avLst/>
+          </a:prstGeom>
+        </p:spPr>
+      </p:pic>
+      <p:sp>
+        <p:nvSpPr>
+          <p:cNvPr id="9" name="Rectangle 8">
+            <a:extLst>
+              <a:ext uri="{FF2B5EF4-FFF2-40B4-BE49-F238E27FC236}">
+                <a16:creationId xmlns:a16="http://schemas.microsoft.com/office/drawing/2014/main" id="{514B49D5-111A-EDA8-2E11-1105B2830688}"/>
+              </a:ext>
+            </a:extLst>
+          </p:cNvPr>
+          <p:cNvSpPr/>
+          <p:nvPr/>
+        </p:nvSpPr>
+        <p:spPr>
+          <a:xfrm>
+            <a:off x="4495315" y="2926285"/>
+            <a:ext cx="2711931" cy="1242304"/>
           </a:xfrm>
           <a:prstGeom prst="rect">
             <a:avLst/>
@@ -5091,10 +5002,56 @@
           </a:p>
         </p:txBody>
       </p:sp>
+      <p:sp>
+        <p:nvSpPr>
+          <p:cNvPr id="13" name="Flèche : droite rayée 12">
+            <a:extLst>
+              <a:ext uri="{FF2B5EF4-FFF2-40B4-BE49-F238E27FC236}">
+                <a16:creationId xmlns:a16="http://schemas.microsoft.com/office/drawing/2014/main" id="{8F804CE9-7DCF-6A3E-3CBD-F752932FEF5D}"/>
+              </a:ext>
+            </a:extLst>
+          </p:cNvPr>
+          <p:cNvSpPr/>
+          <p:nvPr/>
+        </p:nvSpPr>
+        <p:spPr>
+          <a:xfrm rot="1488350">
+            <a:off x="3572205" y="4496901"/>
+            <a:ext cx="997353" cy="733926"/>
+          </a:xfrm>
+          <a:prstGeom prst="stripedRightArrow">
+            <a:avLst/>
+          </a:prstGeom>
+        </p:spPr>
+        <p:style>
+          <a:lnRef idx="2">
+            <a:schemeClr val="accent1">
+              <a:shade val="15000"/>
+            </a:schemeClr>
+          </a:lnRef>
+          <a:fillRef idx="1">
+            <a:schemeClr val="accent1"/>
+          </a:fillRef>
+          <a:effectRef idx="0">
+            <a:schemeClr val="accent1"/>
+          </a:effectRef>
+          <a:fontRef idx="minor">
+            <a:schemeClr val="lt1"/>
+          </a:fontRef>
+        </p:style>
+        <p:txBody>
+          <a:bodyPr rtlCol="0" anchor="ctr"/>
+          <a:lstStyle/>
+          <a:p>
+            <a:pPr algn="ctr"/>
+            <a:endParaRPr lang="fr-BE"/>
+          </a:p>
+        </p:txBody>
+      </p:sp>
     </p:spTree>
     <p:extLst>
       <p:ext uri="{BB962C8B-B14F-4D97-AF65-F5344CB8AC3E}">
-        <p14:creationId xmlns:p14="http://schemas.microsoft.com/office/powerpoint/2010/main" val="2161096809"/>
+        <p14:creationId xmlns:p14="http://schemas.microsoft.com/office/powerpoint/2010/main" val="450544265"/>
       </p:ext>
     </p:extLst>
   </p:cSld>
@@ -5198,10 +5155,13 @@
                   <a:srgbClr val="E6E6E6"/>
                 </a:solidFill>
               </a:rPr>
-              <a:t>Removing code that perform actions from the object to state classes</a:t>
-            </a:r>
-          </a:p>
-          <a:p>
+              <a:t>Create an interface that represent the different actions of the object</a:t>
+            </a:r>
+          </a:p>
+          <a:p>
+            <a:pPr marL="0" indent="0">
+              <a:buNone/>
+            </a:pPr>
             <a:endParaRPr lang="en-US">
               <a:solidFill>
                 <a:srgbClr val="E6E6E6"/>
@@ -5226,7 +5186,7 @@
                   <a:srgbClr val="E6E6E6"/>
                 </a:solidFill>
               </a:rPr>
-              <a:t>Create an interface that represent the different actions of the object</a:t>
+              <a:t>Removing code that represent behaviors from the object</a:t>
             </a:r>
           </a:p>
           <a:p>

</xml_diff>